<commit_message>
Unit 3: Different way to start Spring Boot
</commit_message>
<xml_diff>
--- a/15_Ch20_UpdateDelete.pptx
+++ b/15_Ch20_UpdateDelete.pptx
@@ -5,7 +5,7 @@
     <p:sldMasterId id="2147483648" r:id="rId1"/>
   </p:sldMasterIdLst>
   <p:notesMasterIdLst>
-    <p:notesMasterId r:id="rId15"/>
+    <p:notesMasterId r:id="rId16"/>
   </p:notesMasterIdLst>
   <p:sldIdLst>
     <p:sldId id="256" r:id="rId2"/>
@@ -20,7 +20,8 @@
     <p:sldId id="272" r:id="rId11"/>
     <p:sldId id="273" r:id="rId12"/>
     <p:sldId id="274" r:id="rId13"/>
-    <p:sldId id="259" r:id="rId14"/>
+    <p:sldId id="275" r:id="rId14"/>
+    <p:sldId id="259" r:id="rId15"/>
   </p:sldIdLst>
   <p:sldSz cx="9144000" cy="6858000" type="screen4x3"/>
   <p:notesSz cx="6858000" cy="9144000"/>
@@ -4441,7 +4442,7 @@
               <a:t>javaee</a:t>
             </a:r>
             <a:r>
-              <a:rPr lang="en-US" altLang="zh-TW" sz="1600" b="1" smtClean="0">
+              <a:rPr lang="en-US" altLang="zh-TW" sz="1600" b="1" dirty="0" smtClean="0">
                 <a:solidFill>
                   <a:schemeClr val="tx1"/>
                 </a:solidFill>
@@ -4449,12 +4450,6 @@
               </a:rPr>
               <a:t>”</a:t>
             </a:r>
-            <a:endParaRPr lang="en-US" altLang="zh-TW" sz="1600" b="1" dirty="0" smtClean="0">
-              <a:solidFill>
-                <a:schemeClr val="tx1"/>
-              </a:solidFill>
-              <a:latin typeface="+mj-lt"/>
-            </a:endParaRPr>
           </a:p>
         </p:txBody>
       </p:sp>
@@ -4610,143 +4605,6 @@
         </p:nvSpPr>
         <p:spPr>
           <a:xfrm>
-            <a:off x="0" y="2130425"/>
-            <a:ext cx="9144000" cy="1470025"/>
-          </a:xfrm>
-          <a:gradFill flip="none" rotWithShape="1">
-            <a:gsLst>
-              <a:gs pos="0">
-                <a:srgbClr val="00B0F0">
-                  <a:shade val="30000"/>
-                  <a:satMod val="115000"/>
-                </a:srgbClr>
-              </a:gs>
-              <a:gs pos="50000">
-                <a:srgbClr val="00B0F0">
-                  <a:shade val="67500"/>
-                  <a:satMod val="115000"/>
-                </a:srgbClr>
-              </a:gs>
-              <a:gs pos="100000">
-                <a:srgbClr val="00B0F0">
-                  <a:shade val="100000"/>
-                  <a:satMod val="115000"/>
-                </a:srgbClr>
-              </a:gs>
-            </a:gsLst>
-            <a:path path="circle">
-              <a:fillToRect t="100000" r="100000"/>
-            </a:path>
-            <a:tileRect l="-100000" b="-100000"/>
-          </a:gradFill>
-        </p:spPr>
-        <p:txBody>
-          <a:bodyPr>
-            <a:normAutofit/>
-          </a:bodyPr>
-          <a:lstStyle/>
-          <a:p>
-            <a:r>
-              <a:rPr lang="en-US" altLang="zh-TW" sz="6000" b="1" dirty="0" smtClean="0">
-                <a:solidFill>
-                  <a:srgbClr val="FFFF00"/>
-                </a:solidFill>
-              </a:rPr>
-              <a:t>End of Chapter</a:t>
-            </a:r>
-            <a:endParaRPr lang="zh-TW" altLang="en-US" sz="6000" b="1" dirty="0">
-              <a:solidFill>
-                <a:srgbClr val="FFFF00"/>
-              </a:solidFill>
-            </a:endParaRPr>
-          </a:p>
-        </p:txBody>
-      </p:sp>
-      <p:sp>
-        <p:nvSpPr>
-          <p:cNvPr id="5" name="日期版面配置區 4"/>
-          <p:cNvSpPr>
-            <a:spLocks noGrp="1"/>
-          </p:cNvSpPr>
-          <p:nvPr>
-            <p:ph type="dt" sz="half" idx="10"/>
-          </p:nvPr>
-        </p:nvSpPr>
-        <p:spPr/>
-        <p:txBody>
-          <a:bodyPr/>
-          <a:lstStyle/>
-          <a:p>
-            <a:fld id="{4E46BE27-E923-4EC2-B046-3272AE2A3E5C}" type="datetime1">
-              <a:rPr lang="zh-TW" altLang="en-US" smtClean="0"/>
-              <a:pPr/>
-              <a:t>2018/12/2</a:t>
-            </a:fld>
-            <a:endParaRPr lang="zh-TW" altLang="en-US"/>
-          </a:p>
-        </p:txBody>
-      </p:sp>
-      <p:sp>
-        <p:nvSpPr>
-          <p:cNvPr id="6" name="投影片編號版面配置區 5"/>
-          <p:cNvSpPr>
-            <a:spLocks noGrp="1"/>
-          </p:cNvSpPr>
-          <p:nvPr>
-            <p:ph type="sldNum" sz="quarter" idx="12"/>
-          </p:nvPr>
-        </p:nvSpPr>
-        <p:spPr/>
-        <p:txBody>
-          <a:bodyPr/>
-          <a:lstStyle/>
-          <a:p>
-            <a:fld id="{E4D7E63D-91F2-4366-A2C4-1B00C9E2590E}" type="slidenum">
-              <a:rPr lang="zh-TW" altLang="en-US" smtClean="0"/>
-              <a:pPr/>
-              <a:t>13</a:t>
-            </a:fld>
-            <a:endParaRPr lang="zh-TW" altLang="en-US"/>
-          </a:p>
-        </p:txBody>
-      </p:sp>
-    </p:spTree>
-  </p:cSld>
-  <p:clrMapOvr>
-    <a:masterClrMapping/>
-  </p:clrMapOvr>
-</p:sld>
-</file>
-
-<file path=ppt/slides/slide2.xml><?xml version="1.0" encoding="utf-8"?>
-<p:sld xmlns:a="http://schemas.openxmlformats.org/drawingml/2006/main" xmlns:r="http://schemas.openxmlformats.org/officeDocument/2006/relationships" xmlns:p="http://schemas.openxmlformats.org/presentationml/2006/main">
-  <p:cSld>
-    <p:spTree>
-      <p:nvGrpSpPr>
-        <p:cNvPr id="1" name=""/>
-        <p:cNvGrpSpPr/>
-        <p:nvPr/>
-      </p:nvGrpSpPr>
-      <p:grpSpPr>
-        <a:xfrm>
-          <a:off x="0" y="0"/>
-          <a:ext cx="0" cy="0"/>
-          <a:chOff x="0" y="0"/>
-          <a:chExt cx="0" cy="0"/>
-        </a:xfrm>
-      </p:grpSpPr>
-      <p:sp>
-        <p:nvSpPr>
-          <p:cNvPr id="2" name="標題 1"/>
-          <p:cNvSpPr>
-            <a:spLocks noGrp="1"/>
-          </p:cNvSpPr>
-          <p:nvPr>
-            <p:ph type="ctrTitle"/>
-          </p:nvPr>
-        </p:nvSpPr>
-        <p:spPr>
-          <a:xfrm>
             <a:off x="0" y="1"/>
             <a:ext cx="9144000" cy="764704"/>
           </a:xfrm>
@@ -4811,7 +4669,7 @@
         <p:spPr>
           <a:xfrm>
             <a:off x="395536" y="1412776"/>
-            <a:ext cx="8208912" cy="936104"/>
+            <a:ext cx="8208912" cy="432048"/>
           </a:xfrm>
           <a:ln>
             <a:solidFill>
@@ -4840,46 +4698,14 @@
                 </a:solidFill>
                 <a:latin typeface="+mj-lt"/>
               </a:rPr>
-              <a:t>We implemented the get request and get API in the last previous chapter. </a:t>
-            </a:r>
-          </a:p>
-          <a:p>
-            <a:pPr marL="342900" indent="-342900" algn="l">
-              <a:buClr>
-                <a:srgbClr val="0070C0"/>
-              </a:buClr>
-              <a:buSzPct val="80000"/>
-              <a:buFont typeface="Wingdings" pitchFamily="2" charset="2"/>
-              <a:buChar char="u"/>
-            </a:pPr>
-            <a:r>
-              <a:rPr lang="en-US" altLang="zh-TW" sz="1600" b="1" dirty="0" smtClean="0">
-                <a:solidFill>
-                  <a:schemeClr val="tx1"/>
-                </a:solidFill>
-                <a:latin typeface="+mj-lt"/>
-              </a:rPr>
-              <a:t>Let’s move on the POST to create a new document. </a:t>
-            </a:r>
-          </a:p>
-          <a:p>
-            <a:pPr marL="342900" indent="-342900" algn="l">
-              <a:buClr>
-                <a:srgbClr val="0070C0"/>
-              </a:buClr>
-              <a:buSzPct val="80000"/>
-              <a:buFont typeface="Wingdings" pitchFamily="2" charset="2"/>
-              <a:buChar char="u"/>
-            </a:pPr>
-            <a:r>
-              <a:rPr lang="en-US" altLang="zh-TW" sz="1600" b="1" dirty="0" smtClean="0">
-                <a:solidFill>
-                  <a:schemeClr val="tx1"/>
-                </a:solidFill>
-                <a:latin typeface="+mj-lt"/>
-              </a:rPr>
-              <a:t>To do that, we need to make a POST request “/topics/POST”.</a:t>
-            </a:r>
+              <a:t>We have GET, POST (Create), DELETE, UPDATE, </a:t>
+            </a:r>
+            <a:endParaRPr lang="en-US" altLang="zh-TW" sz="1600" b="1" dirty="0" smtClean="0">
+              <a:solidFill>
+                <a:schemeClr val="tx1"/>
+              </a:solidFill>
+              <a:latin typeface="+mj-lt"/>
+            </a:endParaRPr>
           </a:p>
         </p:txBody>
       </p:sp>
@@ -4992,12 +4818,46 @@
             <a:fld id="{E4D7E63D-91F2-4366-A2C4-1B00C9E2590E}" type="slidenum">
               <a:rPr lang="zh-TW" altLang="en-US" smtClean="0"/>
               <a:pPr/>
-              <a:t>2</a:t>
+              <a:t>13</a:t>
             </a:fld>
             <a:endParaRPr lang="zh-TW" altLang="en-US"/>
           </a:p>
         </p:txBody>
       </p:sp>
+      <p:pic>
+        <p:nvPicPr>
+          <p:cNvPr id="1026" name="Picture 2"/>
+          <p:cNvPicPr>
+            <a:picLocks noChangeAspect="1" noChangeArrowheads="1"/>
+          </p:cNvPicPr>
+          <p:nvPr/>
+        </p:nvPicPr>
+        <p:blipFill>
+          <a:blip r:embed="rId2" cstate="print"/>
+          <a:srcRect/>
+          <a:stretch>
+            <a:fillRect/>
+          </a:stretch>
+        </p:blipFill>
+        <p:spPr bwMode="auto">
+          <a:xfrm>
+            <a:off x="1619672" y="1916832"/>
+            <a:ext cx="5315719" cy="4445716"/>
+          </a:xfrm>
+          <a:prstGeom prst="rect">
+            <a:avLst/>
+          </a:prstGeom>
+          <a:noFill/>
+          <a:ln w="9525">
+            <a:solidFill>
+              <a:srgbClr val="C00000"/>
+            </a:solidFill>
+            <a:miter lim="800000"/>
+            <a:headEnd/>
+            <a:tailEnd/>
+          </a:ln>
+        </p:spPr>
+      </p:pic>
     </p:spTree>
   </p:cSld>
   <p:clrMapOvr>
@@ -5006,7 +4866,144 @@
 </p:sld>
 </file>
 
-<file path=ppt/slides/slide3.xml><?xml version="1.0" encoding="utf-8"?>
+<file path=ppt/slides/slide14.xml><?xml version="1.0" encoding="utf-8"?>
+<p:sld xmlns:a="http://schemas.openxmlformats.org/drawingml/2006/main" xmlns:r="http://schemas.openxmlformats.org/officeDocument/2006/relationships" xmlns:p="http://schemas.openxmlformats.org/presentationml/2006/main">
+  <p:cSld>
+    <p:spTree>
+      <p:nvGrpSpPr>
+        <p:cNvPr id="1" name=""/>
+        <p:cNvGrpSpPr/>
+        <p:nvPr/>
+      </p:nvGrpSpPr>
+      <p:grpSpPr>
+        <a:xfrm>
+          <a:off x="0" y="0"/>
+          <a:ext cx="0" cy="0"/>
+          <a:chOff x="0" y="0"/>
+          <a:chExt cx="0" cy="0"/>
+        </a:xfrm>
+      </p:grpSpPr>
+      <p:sp>
+        <p:nvSpPr>
+          <p:cNvPr id="2" name="標題 1"/>
+          <p:cNvSpPr>
+            <a:spLocks noGrp="1"/>
+          </p:cNvSpPr>
+          <p:nvPr>
+            <p:ph type="ctrTitle"/>
+          </p:nvPr>
+        </p:nvSpPr>
+        <p:spPr>
+          <a:xfrm>
+            <a:off x="0" y="2130425"/>
+            <a:ext cx="9144000" cy="1470025"/>
+          </a:xfrm>
+          <a:gradFill flip="none" rotWithShape="1">
+            <a:gsLst>
+              <a:gs pos="0">
+                <a:srgbClr val="00B0F0">
+                  <a:shade val="30000"/>
+                  <a:satMod val="115000"/>
+                </a:srgbClr>
+              </a:gs>
+              <a:gs pos="50000">
+                <a:srgbClr val="00B0F0">
+                  <a:shade val="67500"/>
+                  <a:satMod val="115000"/>
+                </a:srgbClr>
+              </a:gs>
+              <a:gs pos="100000">
+                <a:srgbClr val="00B0F0">
+                  <a:shade val="100000"/>
+                  <a:satMod val="115000"/>
+                </a:srgbClr>
+              </a:gs>
+            </a:gsLst>
+            <a:path path="circle">
+              <a:fillToRect t="100000" r="100000"/>
+            </a:path>
+            <a:tileRect l="-100000" b="-100000"/>
+          </a:gradFill>
+        </p:spPr>
+        <p:txBody>
+          <a:bodyPr>
+            <a:normAutofit/>
+          </a:bodyPr>
+          <a:lstStyle/>
+          <a:p>
+            <a:r>
+              <a:rPr lang="en-US" altLang="zh-TW" sz="6000" b="1" dirty="0" smtClean="0">
+                <a:solidFill>
+                  <a:srgbClr val="FFFF00"/>
+                </a:solidFill>
+              </a:rPr>
+              <a:t>End of Chapter</a:t>
+            </a:r>
+            <a:endParaRPr lang="zh-TW" altLang="en-US" sz="6000" b="1" dirty="0">
+              <a:solidFill>
+                <a:srgbClr val="FFFF00"/>
+              </a:solidFill>
+            </a:endParaRPr>
+          </a:p>
+        </p:txBody>
+      </p:sp>
+      <p:sp>
+        <p:nvSpPr>
+          <p:cNvPr id="5" name="日期版面配置區 4"/>
+          <p:cNvSpPr>
+            <a:spLocks noGrp="1"/>
+          </p:cNvSpPr>
+          <p:nvPr>
+            <p:ph type="dt" sz="half" idx="10"/>
+          </p:nvPr>
+        </p:nvSpPr>
+        <p:spPr/>
+        <p:txBody>
+          <a:bodyPr/>
+          <a:lstStyle/>
+          <a:p>
+            <a:fld id="{4E46BE27-E923-4EC2-B046-3272AE2A3E5C}" type="datetime1">
+              <a:rPr lang="zh-TW" altLang="en-US" smtClean="0"/>
+              <a:pPr/>
+              <a:t>2018/12/2</a:t>
+            </a:fld>
+            <a:endParaRPr lang="zh-TW" altLang="en-US"/>
+          </a:p>
+        </p:txBody>
+      </p:sp>
+      <p:sp>
+        <p:nvSpPr>
+          <p:cNvPr id="6" name="投影片編號版面配置區 5"/>
+          <p:cNvSpPr>
+            <a:spLocks noGrp="1"/>
+          </p:cNvSpPr>
+          <p:nvPr>
+            <p:ph type="sldNum" sz="quarter" idx="12"/>
+          </p:nvPr>
+        </p:nvSpPr>
+        <p:spPr/>
+        <p:txBody>
+          <a:bodyPr/>
+          <a:lstStyle/>
+          <a:p>
+            <a:fld id="{E4D7E63D-91F2-4366-A2C4-1B00C9E2590E}" type="slidenum">
+              <a:rPr lang="zh-TW" altLang="en-US" smtClean="0"/>
+              <a:pPr/>
+              <a:t>14</a:t>
+            </a:fld>
+            <a:endParaRPr lang="zh-TW" altLang="en-US"/>
+          </a:p>
+        </p:txBody>
+      </p:sp>
+    </p:spTree>
+  </p:cSld>
+  <p:clrMapOvr>
+    <a:masterClrMapping/>
+  </p:clrMapOvr>
+</p:sld>
+</file>
+
+<file path=ppt/slides/slide2.xml><?xml version="1.0" encoding="utf-8"?>
 <p:sld xmlns:a="http://schemas.openxmlformats.org/drawingml/2006/main" xmlns:r="http://schemas.openxmlformats.org/officeDocument/2006/relationships" xmlns:p="http://schemas.openxmlformats.org/presentationml/2006/main">
   <p:cSld>
     <p:spTree>
@@ -5099,7 +5096,7 @@
         <p:spPr>
           <a:xfrm>
             <a:off x="395536" y="1412776"/>
-            <a:ext cx="8208912" cy="360040"/>
+            <a:ext cx="8208912" cy="936104"/>
           </a:xfrm>
           <a:ln>
             <a:solidFill>
@@ -5128,14 +5125,296 @@
                 </a:solidFill>
                 <a:latin typeface="+mj-lt"/>
               </a:rPr>
+              <a:t>We implemented the get request and get API in the last previous chapter. </a:t>
+            </a:r>
+          </a:p>
+          <a:p>
+            <a:pPr marL="342900" indent="-342900" algn="l">
+              <a:buClr>
+                <a:srgbClr val="0070C0"/>
+              </a:buClr>
+              <a:buSzPct val="80000"/>
+              <a:buFont typeface="Wingdings" pitchFamily="2" charset="2"/>
+              <a:buChar char="u"/>
+            </a:pPr>
+            <a:r>
+              <a:rPr lang="en-US" altLang="zh-TW" sz="1600" b="1" dirty="0" smtClean="0">
+                <a:solidFill>
+                  <a:schemeClr val="tx1"/>
+                </a:solidFill>
+                <a:latin typeface="+mj-lt"/>
+              </a:rPr>
+              <a:t>Let’s move on the POST to create a new document. </a:t>
+            </a:r>
+          </a:p>
+          <a:p>
+            <a:pPr marL="342900" indent="-342900" algn="l">
+              <a:buClr>
+                <a:srgbClr val="0070C0"/>
+              </a:buClr>
+              <a:buSzPct val="80000"/>
+              <a:buFont typeface="Wingdings" pitchFamily="2" charset="2"/>
+              <a:buChar char="u"/>
+            </a:pPr>
+            <a:r>
+              <a:rPr lang="en-US" altLang="zh-TW" sz="1600" b="1" dirty="0" smtClean="0">
+                <a:solidFill>
+                  <a:schemeClr val="tx1"/>
+                </a:solidFill>
+                <a:latin typeface="+mj-lt"/>
+              </a:rPr>
+              <a:t>To do that, we need to make a POST request “/topics/POST”.</a:t>
+            </a:r>
+          </a:p>
+        </p:txBody>
+      </p:sp>
+      <p:sp>
+        <p:nvSpPr>
+          <p:cNvPr id="4" name="標題 1"/>
+          <p:cNvSpPr txBox="1">
+            <a:spLocks/>
+          </p:cNvSpPr>
+          <p:nvPr/>
+        </p:nvSpPr>
+        <p:spPr>
+          <a:xfrm>
+            <a:off x="0" y="764704"/>
+            <a:ext cx="9144000" cy="398616"/>
+          </a:xfrm>
+          <a:prstGeom prst="rect">
+            <a:avLst/>
+          </a:prstGeom>
+          <a:gradFill flip="none" rotWithShape="1">
+            <a:gsLst>
+              <a:gs pos="0">
+                <a:srgbClr val="00B0F0">
+                  <a:shade val="30000"/>
+                  <a:satMod val="115000"/>
+                </a:srgbClr>
+              </a:gs>
+              <a:gs pos="50000">
+                <a:srgbClr val="00B0F0">
+                  <a:shade val="67500"/>
+                  <a:satMod val="115000"/>
+                </a:srgbClr>
+              </a:gs>
+              <a:gs pos="100000">
+                <a:srgbClr val="00B0F0">
+                  <a:shade val="100000"/>
+                  <a:satMod val="115000"/>
+                </a:srgbClr>
+              </a:gs>
+            </a:gsLst>
+            <a:path path="circle">
+              <a:fillToRect t="100000" r="100000"/>
+            </a:path>
+            <a:tileRect l="-100000" b="-100000"/>
+          </a:gradFill>
+        </p:spPr>
+        <p:txBody>
+          <a:bodyPr vert="horz" lIns="91440" tIns="45720" rIns="91440" bIns="45720" rtlCol="0" anchor="ctr">
+            <a:normAutofit fontScale="92500"/>
+          </a:bodyPr>
+          <a:lstStyle/>
+          <a:p>
+            <a:r>
+              <a:rPr lang="en-US" altLang="zh-TW" sz="1600" b="1" i="1" smtClean="0"/>
+              <a:t>https://www.youtube.com/watch?v=E7_a-kB46LU&amp;list=PLqq-6Pq4lTTbx8p2oCgcAQGQyqN8XeA1x&amp;index=9</a:t>
+            </a:r>
+            <a:endParaRPr lang="en-US" altLang="zh-TW" sz="1600" b="1" i="1" dirty="0"/>
+          </a:p>
+        </p:txBody>
+      </p:sp>
+      <p:sp>
+        <p:nvSpPr>
+          <p:cNvPr id="5" name="日期版面配置區 4"/>
+          <p:cNvSpPr>
+            <a:spLocks noGrp="1"/>
+          </p:cNvSpPr>
+          <p:nvPr>
+            <p:ph type="dt" sz="half" idx="10"/>
+          </p:nvPr>
+        </p:nvSpPr>
+        <p:spPr>
+          <a:xfrm>
+            <a:off x="457200" y="6356350"/>
+            <a:ext cx="2133600" cy="404246"/>
+          </a:xfrm>
+        </p:spPr>
+        <p:txBody>
+          <a:bodyPr/>
+          <a:lstStyle/>
+          <a:p>
+            <a:fld id="{A4F910E6-8D00-4BAF-8C48-9688E0B449D3}" type="datetime1">
+              <a:rPr lang="zh-TW" altLang="en-US" smtClean="0"/>
+              <a:pPr/>
+              <a:t>2018/12/2</a:t>
+            </a:fld>
+            <a:endParaRPr lang="zh-TW" altLang="en-US"/>
+          </a:p>
+        </p:txBody>
+      </p:sp>
+      <p:sp>
+        <p:nvSpPr>
+          <p:cNvPr id="6" name="投影片編號版面配置區 5"/>
+          <p:cNvSpPr>
+            <a:spLocks noGrp="1"/>
+          </p:cNvSpPr>
+          <p:nvPr>
+            <p:ph type="sldNum" sz="quarter" idx="12"/>
+          </p:nvPr>
+        </p:nvSpPr>
+        <p:spPr>
+          <a:xfrm>
+            <a:off x="6553200" y="6356350"/>
+            <a:ext cx="2133600" cy="404246"/>
+          </a:xfrm>
+        </p:spPr>
+        <p:txBody>
+          <a:bodyPr/>
+          <a:lstStyle/>
+          <a:p>
+            <a:fld id="{E4D7E63D-91F2-4366-A2C4-1B00C9E2590E}" type="slidenum">
+              <a:rPr lang="zh-TW" altLang="en-US" smtClean="0"/>
+              <a:pPr/>
+              <a:t>2</a:t>
+            </a:fld>
+            <a:endParaRPr lang="zh-TW" altLang="en-US"/>
+          </a:p>
+        </p:txBody>
+      </p:sp>
+    </p:spTree>
+  </p:cSld>
+  <p:clrMapOvr>
+    <a:masterClrMapping/>
+  </p:clrMapOvr>
+</p:sld>
+</file>
+
+<file path=ppt/slides/slide3.xml><?xml version="1.0" encoding="utf-8"?>
+<p:sld xmlns:a="http://schemas.openxmlformats.org/drawingml/2006/main" xmlns:r="http://schemas.openxmlformats.org/officeDocument/2006/relationships" xmlns:p="http://schemas.openxmlformats.org/presentationml/2006/main">
+  <p:cSld>
+    <p:spTree>
+      <p:nvGrpSpPr>
+        <p:cNvPr id="1" name=""/>
+        <p:cNvGrpSpPr/>
+        <p:nvPr/>
+      </p:nvGrpSpPr>
+      <p:grpSpPr>
+        <a:xfrm>
+          <a:off x="0" y="0"/>
+          <a:ext cx="0" cy="0"/>
+          <a:chOff x="0" y="0"/>
+          <a:chExt cx="0" cy="0"/>
+        </a:xfrm>
+      </p:grpSpPr>
+      <p:sp>
+        <p:nvSpPr>
+          <p:cNvPr id="2" name="標題 1"/>
+          <p:cNvSpPr>
+            <a:spLocks noGrp="1"/>
+          </p:cNvSpPr>
+          <p:nvPr>
+            <p:ph type="ctrTitle"/>
+          </p:nvPr>
+        </p:nvSpPr>
+        <p:spPr>
+          <a:xfrm>
+            <a:off x="0" y="1"/>
+            <a:ext cx="9144000" cy="764704"/>
+          </a:xfrm>
+          <a:gradFill flip="none" rotWithShape="1">
+            <a:gsLst>
+              <a:gs pos="0">
+                <a:srgbClr val="C00000">
+                  <a:shade val="30000"/>
+                  <a:satMod val="115000"/>
+                </a:srgbClr>
+              </a:gs>
+              <a:gs pos="50000">
+                <a:srgbClr val="C00000">
+                  <a:shade val="67500"/>
+                  <a:satMod val="115000"/>
+                </a:srgbClr>
+              </a:gs>
+              <a:gs pos="100000">
+                <a:srgbClr val="C00000">
+                  <a:shade val="100000"/>
+                  <a:satMod val="115000"/>
+                </a:srgbClr>
+              </a:gs>
+            </a:gsLst>
+            <a:path path="circle">
+              <a:fillToRect t="100000" r="100000"/>
+            </a:path>
+            <a:tileRect l="-100000" b="-100000"/>
+          </a:gradFill>
+        </p:spPr>
+        <p:txBody>
+          <a:bodyPr/>
+          <a:lstStyle/>
+          <a:p>
+            <a:pPr algn="l"/>
+            <a:r>
+              <a:rPr lang="en-US" altLang="zh-TW" b="1" dirty="0" smtClean="0">
+                <a:solidFill>
+                  <a:srgbClr val="FFFF00"/>
+                </a:solidFill>
+              </a:rPr>
+              <a:t>20 Update and Delete</a:t>
+            </a:r>
+            <a:endParaRPr lang="zh-TW" altLang="en-US" b="1" dirty="0">
+              <a:solidFill>
+                <a:srgbClr val="FFFF00"/>
+              </a:solidFill>
+            </a:endParaRPr>
+          </a:p>
+        </p:txBody>
+      </p:sp>
+      <p:sp>
+        <p:nvSpPr>
+          <p:cNvPr id="3" name="副標題 2"/>
+          <p:cNvSpPr>
+            <a:spLocks noGrp="1"/>
+          </p:cNvSpPr>
+          <p:nvPr>
+            <p:ph type="subTitle" idx="1"/>
+          </p:nvPr>
+        </p:nvSpPr>
+        <p:spPr>
+          <a:xfrm>
+            <a:off x="395536" y="1412776"/>
+            <a:ext cx="8208912" cy="360040"/>
+          </a:xfrm>
+          <a:ln>
+            <a:solidFill>
+              <a:srgbClr val="C00000"/>
+            </a:solidFill>
+          </a:ln>
+        </p:spPr>
+        <p:txBody>
+          <a:bodyPr>
+            <a:noAutofit/>
+          </a:bodyPr>
+          <a:lstStyle/>
+          <a:p>
+            <a:pPr marL="342900" indent="-342900" algn="l">
+              <a:buClr>
+                <a:srgbClr val="0070C0"/>
+              </a:buClr>
+              <a:buSzPct val="80000"/>
+              <a:buFont typeface="Wingdings" pitchFamily="2" charset="2"/>
+              <a:buChar char="u"/>
+            </a:pPr>
+            <a:r>
+              <a:rPr lang="en-US" altLang="zh-TW" sz="1600" b="1" dirty="0" smtClean="0">
+                <a:solidFill>
+                  <a:schemeClr val="tx1"/>
+                </a:solidFill>
+                <a:latin typeface="+mj-lt"/>
+              </a:rPr>
               <a:t>URL mapping to Method for PUT:</a:t>
             </a:r>
-            <a:endParaRPr lang="en-US" altLang="zh-TW" sz="1600" b="1" dirty="0" smtClean="0">
-              <a:solidFill>
-                <a:schemeClr val="tx1"/>
-              </a:solidFill>
-              <a:latin typeface="+mj-lt"/>
-            </a:endParaRPr>
           </a:p>
         </p:txBody>
       </p:sp>
@@ -5500,12 +5779,6 @@
               </a:rPr>
               <a:t>Update ArrayList topics (i, topic) when key = “Java/JavaScript/Spring” is matched.</a:t>
             </a:r>
-            <a:endParaRPr lang="en-US" altLang="zh-TW" sz="1600" b="1" dirty="0" smtClean="0">
-              <a:solidFill>
-                <a:schemeClr val="tx1"/>
-              </a:solidFill>
-              <a:latin typeface="+mj-lt"/>
-            </a:endParaRPr>
           </a:p>
         </p:txBody>
       </p:sp>

</xml_diff>